<commit_message>
commiting .net U slide deck
</commit_message>
<xml_diff>
--- a/Samples/timwingfield/Intro-to-asp.net-ajax/.Net U AJAX - Slide Deck.pptx
+++ b/Samples/timwingfield/Intro-to-asp.net-ajax/.Net U AJAX - Slide Deck.pptx
@@ -2453,10 +2453,9 @@
               <a:defRPr/>
             </a:pPr>
             <a:r>
-              <a:rPr lang="en-US" baseline="0" smtClean="0"/>
+              <a:rPr lang="en-US" baseline="0" dirty="0" smtClean="0"/>
               <a:t>Questions?</a:t>
             </a:r>
-            <a:endParaRPr lang="en-US" baseline="0" dirty="0" smtClean="0"/>
           </a:p>
         </p:txBody>
       </p:sp>
@@ -3316,11 +3315,7 @@
             </a:r>
             <a:r>
               <a:rPr lang="en-US" baseline="0" dirty="0" smtClean="0"/>
-              <a:t> AJAX libraries because of the server </a:t>
-            </a:r>
-            <a:r>
-              <a:rPr lang="en-US" baseline="0" smtClean="0"/>
-              <a:t>side components</a:t>
+              <a:t> AJAX libraries because of the server side components</a:t>
             </a:r>
             <a:endParaRPr lang="en-US" dirty="0"/>
           </a:p>
@@ -8296,18 +8291,10 @@
             </a:r>
           </a:p>
           <a:p>
-            <a:r>
-              <a:rPr lang="en-US" dirty="0" smtClean="0"/>
-              <a:t>Matt </a:t>
-            </a:r>
-            <a:r>
-              <a:rPr lang="en-US" dirty="0" err="1" smtClean="0"/>
-              <a:t>Berseth</a:t>
-            </a:r>
-            <a:r>
-              <a:rPr lang="en-US" dirty="0" smtClean="0"/>
-              <a:t>: mattberseth.com</a:t>
-            </a:r>
+            <a:pPr>
+              <a:buNone/>
+            </a:pPr>
+            <a:endParaRPr lang="en-US" dirty="0" smtClean="0"/>
           </a:p>
           <a:p>
             <a:endParaRPr lang="en-US" dirty="0"/>
@@ -8423,7 +8410,11 @@
           <a:p>
             <a:r>
               <a:rPr lang="en-US" sz="2800" dirty="0" smtClean="0"/>
-              <a:t>Code and Slides: code.google.com/p/</a:t>
+              <a:t>Code and Slides: </a:t>
+            </a:r>
+            <a:r>
+              <a:rPr lang="en-US" sz="2800" dirty="0" smtClean="0"/>
+              <a:t>code.google.com/p/</a:t>
             </a:r>
             <a:r>
               <a:rPr lang="en-US" sz="2800" dirty="0" err="1" smtClean="0"/>
@@ -8431,7 +8422,15 @@
             </a:r>
             <a:r>
               <a:rPr lang="en-US" sz="2800" dirty="0" smtClean="0"/>
-              <a:t>/source/browse/Samples/Intro-to-asp.net-</a:t>
+              <a:t>/source/browse/Samples/</a:t>
+            </a:r>
+            <a:r>
+              <a:rPr lang="en-US" sz="2800" dirty="0" err="1" smtClean="0"/>
+              <a:t>timwingfield</a:t>
+            </a:r>
+            <a:r>
+              <a:rPr lang="en-US" sz="2800" dirty="0" smtClean="0"/>
+              <a:t>/Intro-to-asp.net-</a:t>
             </a:r>
             <a:r>
               <a:rPr lang="en-US" sz="2800" dirty="0" err="1" smtClean="0"/>

</xml_diff>